<commit_message>
update SYX pre script
</commit_message>
<xml_diff>
--- a/Panorama-Stitching-base-on-SIFT/pre/SIFT.pptx
+++ b/Panorama-Stitching-base-on-SIFT/pre/SIFT.pptx
@@ -6490,92 +6490,6 @@
           <a:p>
             <a:pPr algn="ctr"/>
             <a:endParaRPr kumimoji="1" lang="zh-CN" altLang="en-US"/>
-          </a:p>
-        </p:txBody>
-      </p:sp>
-      <p:sp>
-        <p:nvSpPr>
-          <p:cNvPr id="14" name="文本框 13">
-            <a:extLst>
-              <a:ext uri="{FF2B5EF4-FFF2-40B4-BE49-F238E27FC236}">
-                <a16:creationId xmlns:a16="http://schemas.microsoft.com/office/drawing/2014/main" id="{7BED08B3-A35D-FE46-B494-C098098540B9}"/>
-              </a:ext>
-            </a:extLst>
-          </p:cNvPr>
-          <p:cNvSpPr txBox="1"/>
-          <p:nvPr userDrawn="1"/>
-        </p:nvSpPr>
-        <p:spPr>
-          <a:xfrm>
-            <a:off x="8588189" y="6183685"/>
-            <a:ext cx="3953435" cy="670953"/>
-          </a:xfrm>
-          <a:prstGeom prst="rect">
-            <a:avLst/>
-          </a:prstGeom>
-          <a:noFill/>
-        </p:spPr>
-        <p:txBody>
-          <a:bodyPr wrap="square" rtlCol="0">
-            <a:spAutoFit/>
-          </a:bodyPr>
-          <a:lstStyle/>
-          <a:p>
-            <a:pPr marL="0" marR="0" lvl="0" indent="0" algn="l" defTabSz="914400" rtl="0" eaLnBrk="1" fontAlgn="auto" latinLnBrk="0" hangingPunct="1">
-              <a:lnSpc>
-                <a:spcPct val="90000"/>
-              </a:lnSpc>
-              <a:spcBef>
-                <a:spcPts val="1000"/>
-              </a:spcBef>
-              <a:spcAft>
-                <a:spcPts val="0"/>
-              </a:spcAft>
-              <a:buClrTx/>
-              <a:buSzTx/>
-              <a:buFont typeface="Arial" panose="020B0604020202020204" pitchFamily="34" charset="0"/>
-              <a:buNone/>
-              <a:tabLst/>
-              <a:defRPr/>
-            </a:pPr>
-            <a:r>
-              <a:rPr kumimoji="1" lang="en-US" altLang="zh-CN" sz="2400" b="0" i="0" u="none" strike="noStrike" kern="1200" cap="none" spc="0" normalizeH="0" baseline="0" noProof="0" dirty="0">
-                <a:ln>
-                  <a:noFill/>
-                </a:ln>
-                <a:solidFill>
-                  <a:schemeClr val="bg1"/>
-                </a:solidFill>
-                <a:effectLst/>
-                <a:uLnTx/>
-                <a:uFillTx/>
-                <a:latin typeface="+mn-lt"/>
-                <a:ea typeface="+mn-ea"/>
-                <a:cs typeface="+mn-cs"/>
-              </a:rPr>
-              <a:t>Zhe ZHANG, SSE, 2020</a:t>
-            </a:r>
-            <a:endParaRPr kumimoji="1" lang="zh-CN" altLang="en-US" sz="2400" b="0" i="0" u="none" strike="noStrike" kern="1200" cap="none" spc="0" normalizeH="0" baseline="0" noProof="0" dirty="0">
-              <a:ln>
-                <a:noFill/>
-              </a:ln>
-              <a:solidFill>
-                <a:schemeClr val="bg1"/>
-              </a:solidFill>
-              <a:effectLst/>
-              <a:uLnTx/>
-              <a:uFillTx/>
-              <a:latin typeface="+mn-lt"/>
-              <a:ea typeface="+mn-ea"/>
-              <a:cs typeface="+mn-cs"/>
-            </a:endParaRPr>
-          </a:p>
-          <a:p>
-            <a:endParaRPr kumimoji="1" lang="zh-CN" altLang="en-US" sz="1600" dirty="0">
-              <a:solidFill>
-                <a:schemeClr val="bg1"/>
-              </a:solidFill>
-            </a:endParaRPr>
           </a:p>
         </p:txBody>
       </p:sp>

</xml_diff>